<commit_message>
Add pdf presentation, including youtube link, update ppt slides
</commit_message>
<xml_diff>
--- a/presentation/A Scalable Workflow for Evaluating Object Hallucination in Multimodal LLMs.pptx
+++ b/presentation/A Scalable Workflow for Evaluating Object Hallucination in Multimodal LLMs.pptx
@@ -13545,7 +13545,7 @@
             </a:pPr>
             <a:r>
               <a:rPr lang="en-US" b="0" dirty="0"/>
-              <a:t>Baseline prediction: No</a:t>
+              <a:t>Baseline prediction: Yes</a:t>
             </a:r>
           </a:p>
           <a:p>
@@ -13558,8 +13558,8 @@
               <a:t>Mitigation prompt prediction: </a:t>
             </a:r>
             <a:r>
-              <a:rPr lang="en-US"/>
-              <a:t>Yes</a:t>
+              <a:rPr lang="en-US" dirty="0"/>
+              <a:t>No</a:t>
             </a:r>
           </a:p>
           <a:p>
@@ -13569,7 +13569,7 @@
             </a:pPr>
             <a:r>
               <a:rPr lang="en-US" b="0" dirty="0"/>
-              <a:t>Ground truth: Yes </a:t>
+              <a:t>Ground truth: No</a:t>
             </a:r>
           </a:p>
         </p:txBody>
@@ -14829,8 +14829,18 @@
           </a:p>
           <a:p>
             <a:r>
-              <a:rPr lang="en-US" sz="2000"/>
+              <a:rPr lang="en-US" sz="2000" dirty="0"/>
               <a:t>YouTube: </a:t>
+            </a:r>
+            <a:r>
+              <a:rPr lang="en-US" sz="2000" dirty="0">
+                <a:hlinkClick r:id="rId3"/>
+              </a:rPr>
+              <a:t>https://youtu.be/QBVE6niUrPw</a:t>
+            </a:r>
+            <a:r>
+              <a:rPr lang="en-US" sz="2000" dirty="0"/>
+              <a:t> </a:t>
             </a:r>
           </a:p>
           <a:p>
@@ -22813,8 +22823,8 @@
         </p:nvSpPr>
         <p:spPr>
           <a:xfrm>
-            <a:off x="466722" y="586855"/>
-            <a:ext cx="3201366" cy="3387497"/>
+            <a:off x="-3057" y="586855"/>
+            <a:ext cx="4037835" cy="3387497"/>
           </a:xfrm>
         </p:spPr>
         <p:txBody>
@@ -22825,12 +22835,44 @@
           <a:p>
             <a:pPr algn="r"/>
             <a:r>
-              <a:rPr lang="en-US" sz="4000">
+              <a:rPr lang="en-US" sz="4000" dirty="0">
                 <a:solidFill>
                   <a:srgbClr val="FFFFFF"/>
                 </a:solidFill>
               </a:rPr>
               <a:t>Prompt Design</a:t>
+            </a:r>
+            <a:br>
+              <a:rPr lang="en-US" sz="4000" dirty="0">
+                <a:solidFill>
+                  <a:srgbClr val="FFFFFF"/>
+                </a:solidFill>
+              </a:rPr>
+            </a:br>
+            <a:r>
+              <a:rPr lang="en-US" sz="4000" dirty="0">
+                <a:solidFill>
+                  <a:srgbClr val="FFFFFF"/>
+                </a:solidFill>
+              </a:rPr>
+              <a:t>(Approach: </a:t>
+            </a:r>
+            <a:r>
+              <a:rPr lang="en-US" sz="4000" dirty="0">
+                <a:solidFill>
+                  <a:srgbClr val="FFFFFF"/>
+                </a:solidFill>
+                <a:hlinkClick r:id="rId2"/>
+              </a:rPr>
+              <a:t>POPE</a:t>
+            </a:r>
+            <a:r>
+              <a:rPr lang="en-US" sz="4000" dirty="0">
+                <a:solidFill>
+                  <a:srgbClr val="FFFFFF"/>
+                </a:solidFill>
+              </a:rPr>
+              <a:t>)</a:t>
             </a:r>
           </a:p>
         </p:txBody>
@@ -22854,7 +22896,7 @@
         <p:spPr>
           <a:xfrm>
             <a:off x="4810259" y="649480"/>
-            <a:ext cx="6555347" cy="5546047"/>
+            <a:ext cx="6555347" cy="5870590"/>
           </a:xfrm>
         </p:spPr>
         <p:txBody>
@@ -22987,7 +23029,24 @@
             </a:r>
           </a:p>
           <a:p>
-            <a:endParaRPr lang="en-US" sz="1300" dirty="0"/>
+            <a:r>
+              <a:rPr lang="en-US" sz="1300" b="1" dirty="0"/>
+              <a:t>POPE</a:t>
+            </a:r>
+            <a:r>
+              <a:rPr lang="en-US" sz="1300" dirty="0"/>
+              <a:t>: </a:t>
+            </a:r>
+            <a:r>
+              <a:rPr lang="en-US" sz="1300" dirty="0">
+                <a:hlinkClick r:id="rId2"/>
+              </a:rPr>
+              <a:t>https://arxiv.org/abs/2305.10355</a:t>
+            </a:r>
+            <a:r>
+              <a:rPr lang="en-US" sz="1300" dirty="0"/>
+              <a:t> </a:t>
+            </a:r>
           </a:p>
         </p:txBody>
       </p:sp>

</xml_diff>